<commit_message>
Finalize All Project Documents
</commit_message>
<xml_diff>
--- a/Documents/Molopt - Full Project Presentation.pptx
+++ b/Documents/Molopt - Full Project Presentation.pptx
@@ -20013,7 +20013,7 @@
           <a:p>
             <a:fld id="{2046D6FB-4460-4DEF-B71B-7631DC3490B3}" type="datetimeFigureOut">
               <a:rPr lang="en-US" smtClean="0"/>
-              <a:t>5/26/2023</a:t>
+              <a:t>6/4/2023</a:t>
             </a:fld>
             <a:endParaRPr lang="en-US"/>
           </a:p>
@@ -21478,7 +21478,7 @@
           <a:p>
             <a:fld id="{EFBA5EAA-4DAB-45C1-9CCB-89B72C47B331}" type="datetimeFigureOut">
               <a:rPr lang="en-US" smtClean="0"/>
-              <a:t>5/26/2023</a:t>
+              <a:t>6/4/2023</a:t>
             </a:fld>
             <a:endParaRPr lang="en-US"/>
           </a:p>
@@ -21774,7 +21774,7 @@
           <a:p>
             <a:fld id="{EFBA5EAA-4DAB-45C1-9CCB-89B72C47B331}" type="datetimeFigureOut">
               <a:rPr lang="en-US" smtClean="0"/>
-              <a:t>5/26/2023</a:t>
+              <a:t>6/4/2023</a:t>
             </a:fld>
             <a:endParaRPr lang="en-US"/>
           </a:p>
@@ -22022,7 +22022,7 @@
           <a:p>
             <a:fld id="{EFBA5EAA-4DAB-45C1-9CCB-89B72C47B331}" type="datetimeFigureOut">
               <a:rPr lang="en-US" smtClean="0"/>
-              <a:t>5/26/2023</a:t>
+              <a:t>6/4/2023</a:t>
             </a:fld>
             <a:endParaRPr lang="en-US"/>
           </a:p>
@@ -22562,7 +22562,7 @@
           <a:p>
             <a:fld id="{EFBA5EAA-4DAB-45C1-9CCB-89B72C47B331}" type="datetimeFigureOut">
               <a:rPr lang="en-US" smtClean="0"/>
-              <a:t>5/26/2023</a:t>
+              <a:t>6/4/2023</a:t>
             </a:fld>
             <a:endParaRPr lang="en-US"/>
           </a:p>
@@ -22810,7 +22810,7 @@
           <a:p>
             <a:fld id="{EFBA5EAA-4DAB-45C1-9CCB-89B72C47B331}" type="datetimeFigureOut">
               <a:rPr lang="en-US" smtClean="0"/>
-              <a:t>5/26/2023</a:t>
+              <a:t>6/4/2023</a:t>
             </a:fld>
             <a:endParaRPr lang="en-US"/>
           </a:p>
@@ -23342,7 +23342,7 @@
           <a:p>
             <a:fld id="{EFBA5EAA-4DAB-45C1-9CCB-89B72C47B331}" type="datetimeFigureOut">
               <a:rPr lang="en-US" smtClean="0"/>
-              <a:t>5/26/2023</a:t>
+              <a:t>6/4/2023</a:t>
             </a:fld>
             <a:endParaRPr lang="en-US"/>
           </a:p>
@@ -23639,7 +23639,7 @@
           <a:p>
             <a:fld id="{EFBA5EAA-4DAB-45C1-9CCB-89B72C47B331}" type="datetimeFigureOut">
               <a:rPr lang="en-US" smtClean="0"/>
-              <a:t>5/26/2023</a:t>
+              <a:t>6/4/2023</a:t>
             </a:fld>
             <a:endParaRPr lang="en-US"/>
           </a:p>
@@ -23813,7 +23813,7 @@
           <a:p>
             <a:fld id="{EFBA5EAA-4DAB-45C1-9CCB-89B72C47B331}" type="datetimeFigureOut">
               <a:rPr lang="en-US" smtClean="0"/>
-              <a:t>5/26/2023</a:t>
+              <a:t>6/4/2023</a:t>
             </a:fld>
             <a:endParaRPr lang="en-US"/>
           </a:p>
@@ -23993,7 +23993,7 @@
           <a:p>
             <a:fld id="{EFBA5EAA-4DAB-45C1-9CCB-89B72C47B331}" type="datetimeFigureOut">
               <a:rPr lang="en-US" smtClean="0"/>
-              <a:t>5/26/2023</a:t>
+              <a:t>6/4/2023</a:t>
             </a:fld>
             <a:endParaRPr lang="en-US"/>
           </a:p>
@@ -24163,7 +24163,7 @@
           <a:p>
             <a:fld id="{EFBA5EAA-4DAB-45C1-9CCB-89B72C47B331}" type="datetimeFigureOut">
               <a:rPr lang="en-US" smtClean="0"/>
-              <a:t>5/26/2023</a:t>
+              <a:t>6/4/2023</a:t>
             </a:fld>
             <a:endParaRPr lang="en-US"/>
           </a:p>
@@ -24414,7 +24414,7 @@
           <a:p>
             <a:fld id="{EFBA5EAA-4DAB-45C1-9CCB-89B72C47B331}" type="datetimeFigureOut">
               <a:rPr lang="en-US" smtClean="0"/>
-              <a:t>5/26/2023</a:t>
+              <a:t>6/4/2023</a:t>
             </a:fld>
             <a:endParaRPr lang="en-US"/>
           </a:p>
@@ -24711,7 +24711,7 @@
           <a:p>
             <a:fld id="{EFBA5EAA-4DAB-45C1-9CCB-89B72C47B331}" type="datetimeFigureOut">
               <a:rPr lang="en-US" smtClean="0"/>
-              <a:t>5/26/2023</a:t>
+              <a:t>6/4/2023</a:t>
             </a:fld>
             <a:endParaRPr lang="en-US"/>
           </a:p>
@@ -25153,7 +25153,7 @@
           <a:p>
             <a:fld id="{EFBA5EAA-4DAB-45C1-9CCB-89B72C47B331}" type="datetimeFigureOut">
               <a:rPr lang="en-US" smtClean="0"/>
-              <a:t>5/26/2023</a:t>
+              <a:t>6/4/2023</a:t>
             </a:fld>
             <a:endParaRPr lang="en-US"/>
           </a:p>
@@ -25271,7 +25271,7 @@
           <a:p>
             <a:fld id="{EFBA5EAA-4DAB-45C1-9CCB-89B72C47B331}" type="datetimeFigureOut">
               <a:rPr lang="en-US" smtClean="0"/>
-              <a:t>5/26/2023</a:t>
+              <a:t>6/4/2023</a:t>
             </a:fld>
             <a:endParaRPr lang="en-US"/>
           </a:p>
@@ -25366,7 +25366,7 @@
           <a:p>
             <a:fld id="{EFBA5EAA-4DAB-45C1-9CCB-89B72C47B331}" type="datetimeFigureOut">
               <a:rPr lang="en-US" smtClean="0"/>
-              <a:t>5/26/2023</a:t>
+              <a:t>6/4/2023</a:t>
             </a:fld>
             <a:endParaRPr lang="en-US"/>
           </a:p>
@@ -25649,7 +25649,7 @@
           <a:p>
             <a:fld id="{EFBA5EAA-4DAB-45C1-9CCB-89B72C47B331}" type="datetimeFigureOut">
               <a:rPr lang="en-US" smtClean="0"/>
-              <a:t>5/26/2023</a:t>
+              <a:t>6/4/2023</a:t>
             </a:fld>
             <a:endParaRPr lang="en-US"/>
           </a:p>
@@ -25940,7 +25940,7 @@
           <a:p>
             <a:fld id="{EFBA5EAA-4DAB-45C1-9CCB-89B72C47B331}" type="datetimeFigureOut">
               <a:rPr lang="en-US" smtClean="0"/>
-              <a:t>5/26/2023</a:t>
+              <a:t>6/4/2023</a:t>
             </a:fld>
             <a:endParaRPr lang="en-US"/>
           </a:p>
@@ -26470,7 +26470,7 @@
           <a:p>
             <a:fld id="{EFBA5EAA-4DAB-45C1-9CCB-89B72C47B331}" type="datetimeFigureOut">
               <a:rPr lang="en-US" smtClean="0"/>
-              <a:t>5/26/2023</a:t>
+              <a:t>6/4/2023</a:t>
             </a:fld>
             <a:endParaRPr lang="en-US"/>
           </a:p>
@@ -29222,30 +29222,7 @@
                 </a:solidFill>
                 <a:latin typeface="-apple-system"/>
               </a:rPr>
-              <a:t>MolOpt is a global web-application that developed to be used by researchers working in the   </a:t>
-            </a:r>
-          </a:p>
-          <a:p>
-            <a:pPr marL="0" marR="0" indent="0">
-              <a:lnSpc>
-                <a:spcPct val="107000"/>
-              </a:lnSpc>
-              <a:spcBef>
-                <a:spcPts val="0"/>
-              </a:spcBef>
-              <a:spcAft>
-                <a:spcPts val="0"/>
-              </a:spcAft>
-              <a:buNone/>
-            </a:pPr>
-            <a:r>
-              <a:rPr lang="en-US" sz="2900" dirty="0">
-                <a:solidFill>
-                  <a:srgbClr val="1F2328"/>
-                </a:solidFill>
-                <a:latin typeface="-apple-system"/>
-              </a:rPr>
-              <a:t>field of small fragment-based inhibitors and is intended to be helpful in optimization of ligand databases.</a:t>
+              <a:t>MolOpt is a global web-application that developed to be used by researchers working in the   field of small fragment-based inhibitors and is intended to be helpful in optimization of ligand databases.</a:t>
             </a:r>
           </a:p>
           <a:p>

</xml_diff>